<commit_message>
Updated network files to v65 and split p-p m-m and p-m
</commit_message>
<xml_diff>
--- a/docs/Architecture.pptx
+++ b/docs/Architecture.pptx
@@ -9,6 +9,7 @@
     <p:sldId id="257" r:id="rId3"/>
     <p:sldId id="259" r:id="rId4"/>
     <p:sldId id="258" r:id="rId5"/>
+    <p:sldId id="260" r:id="rId6"/>
   </p:sldIdLst>
   <p:sldSz cx="12192000" cy="6858000"/>
   <p:notesSz cx="6858000" cy="9144000"/>
@@ -107,11 +108,12 @@
       </a:defRPr>
     </a:lvl9pPr>
   </p:defaultTextStyle>
+  <p:extLst>
+    <p:ext uri="{EFAFB233-063F-42B5-8137-9DF3F51BA10A}">
+      <p15:sldGuideLst xmlns:p15="http://schemas.microsoft.com/office/powerpoint/2012/main"/>
+    </p:ext>
+  </p:extLst>
 </p:presentation>
-</file>
-
-<file path=ppt/revisionInfo.xml><?xml version="1.0" encoding="utf-8"?>
-<p1510:revInfo xmlns:a="http://schemas.openxmlformats.org/drawingml/2006/main" xmlns:r="http://schemas.openxmlformats.org/officeDocument/2006/relationships" xmlns:p1510="http://schemas.microsoft.com/office/powerpoint/2015/10/main"/>
 </file>
 
 <file path=ppt/slideLayouts/slideLayout1.xml><?xml version="1.0" encoding="utf-8"?>
@@ -263,7 +265,7 @@
           <a:p>
             <a:fld id="{54F1D32B-7D3B-4D60-9555-54627BDE394B}" type="datetimeFigureOut">
               <a:rPr lang="en-GB" smtClean="0"/>
-              <a:t>01/02/2018</a:t>
+              <a:t>20/05/2018</a:t>
             </a:fld>
             <a:endParaRPr lang="en-GB"/>
           </a:p>
@@ -463,7 +465,7 @@
           <a:p>
             <a:fld id="{54F1D32B-7D3B-4D60-9555-54627BDE394B}" type="datetimeFigureOut">
               <a:rPr lang="en-GB" smtClean="0"/>
-              <a:t>01/02/2018</a:t>
+              <a:t>20/05/2018</a:t>
             </a:fld>
             <a:endParaRPr lang="en-GB"/>
           </a:p>
@@ -673,7 +675,7 @@
           <a:p>
             <a:fld id="{54F1D32B-7D3B-4D60-9555-54627BDE394B}" type="datetimeFigureOut">
               <a:rPr lang="en-GB" smtClean="0"/>
-              <a:t>01/02/2018</a:t>
+              <a:t>20/05/2018</a:t>
             </a:fld>
             <a:endParaRPr lang="en-GB"/>
           </a:p>
@@ -873,7 +875,7 @@
           <a:p>
             <a:fld id="{54F1D32B-7D3B-4D60-9555-54627BDE394B}" type="datetimeFigureOut">
               <a:rPr lang="en-GB" smtClean="0"/>
-              <a:t>01/02/2018</a:t>
+              <a:t>20/05/2018</a:t>
             </a:fld>
             <a:endParaRPr lang="en-GB"/>
           </a:p>
@@ -1149,7 +1151,7 @@
           <a:p>
             <a:fld id="{54F1D32B-7D3B-4D60-9555-54627BDE394B}" type="datetimeFigureOut">
               <a:rPr lang="en-GB" smtClean="0"/>
-              <a:t>01/02/2018</a:t>
+              <a:t>20/05/2018</a:t>
             </a:fld>
             <a:endParaRPr lang="en-GB"/>
           </a:p>
@@ -1417,7 +1419,7 @@
           <a:p>
             <a:fld id="{54F1D32B-7D3B-4D60-9555-54627BDE394B}" type="datetimeFigureOut">
               <a:rPr lang="en-GB" smtClean="0"/>
-              <a:t>01/02/2018</a:t>
+              <a:t>20/05/2018</a:t>
             </a:fld>
             <a:endParaRPr lang="en-GB"/>
           </a:p>
@@ -1832,7 +1834,7 @@
           <a:p>
             <a:fld id="{54F1D32B-7D3B-4D60-9555-54627BDE394B}" type="datetimeFigureOut">
               <a:rPr lang="en-GB" smtClean="0"/>
-              <a:t>01/02/2018</a:t>
+              <a:t>20/05/2018</a:t>
             </a:fld>
             <a:endParaRPr lang="en-GB"/>
           </a:p>
@@ -1974,7 +1976,7 @@
           <a:p>
             <a:fld id="{54F1D32B-7D3B-4D60-9555-54627BDE394B}" type="datetimeFigureOut">
               <a:rPr lang="en-GB" smtClean="0"/>
-              <a:t>01/02/2018</a:t>
+              <a:t>20/05/2018</a:t>
             </a:fld>
             <a:endParaRPr lang="en-GB"/>
           </a:p>
@@ -2087,7 +2089,7 @@
           <a:p>
             <a:fld id="{54F1D32B-7D3B-4D60-9555-54627BDE394B}" type="datetimeFigureOut">
               <a:rPr lang="en-GB" smtClean="0"/>
-              <a:t>01/02/2018</a:t>
+              <a:t>20/05/2018</a:t>
             </a:fld>
             <a:endParaRPr lang="en-GB"/>
           </a:p>
@@ -2400,7 +2402,7 @@
           <a:p>
             <a:fld id="{54F1D32B-7D3B-4D60-9555-54627BDE394B}" type="datetimeFigureOut">
               <a:rPr lang="en-GB" smtClean="0"/>
-              <a:t>01/02/2018</a:t>
+              <a:t>20/05/2018</a:t>
             </a:fld>
             <a:endParaRPr lang="en-GB"/>
           </a:p>
@@ -2689,7 +2691,7 @@
           <a:p>
             <a:fld id="{54F1D32B-7D3B-4D60-9555-54627BDE394B}" type="datetimeFigureOut">
               <a:rPr lang="en-GB" smtClean="0"/>
-              <a:t>01/02/2018</a:t>
+              <a:t>20/05/2018</a:t>
             </a:fld>
             <a:endParaRPr lang="en-GB"/>
           </a:p>
@@ -2932,7 +2934,7 @@
           <a:p>
             <a:fld id="{54F1D32B-7D3B-4D60-9555-54627BDE394B}" type="datetimeFigureOut">
               <a:rPr lang="en-GB" smtClean="0"/>
-              <a:t>01/02/2018</a:t>
+              <a:t>20/05/2018</a:t>
             </a:fld>
             <a:endParaRPr lang="en-GB"/>
           </a:p>
@@ -3785,394 +3787,509 @@
           </a:p>
         </p:txBody>
       </p:sp>
-      <p:sp>
-        <p:nvSpPr>
-          <p:cNvPr id="4" name="Flowchart: Data 3">
-            <a:extLst>
-              <a:ext uri="{FF2B5EF4-FFF2-40B4-BE49-F238E27FC236}">
-                <a16:creationId xmlns:a16="http://schemas.microsoft.com/office/drawing/2014/main" id="{613C46D4-C182-49C8-9EB4-4CCED1DA454E}"/>
-              </a:ext>
-            </a:extLst>
-          </p:cNvPr>
-          <p:cNvSpPr/>
+      <p:grpSp>
+        <p:nvGrpSpPr>
+          <p:cNvPr id="13" name="Group 12">
+            <a:extLst>
+              <a:ext uri="{FF2B5EF4-FFF2-40B4-BE49-F238E27FC236}">
+                <a16:creationId xmlns:a16="http://schemas.microsoft.com/office/drawing/2014/main" id="{15CE495B-177E-49A8-91B3-48CC637B231C}"/>
+              </a:ext>
+            </a:extLst>
+          </p:cNvPr>
+          <p:cNvGrpSpPr/>
           <p:nvPr/>
-        </p:nvSpPr>
-        <p:spPr>
+        </p:nvGrpSpPr>
+        <p:grpSpPr>
           <a:xfrm>
-            <a:off x="1418474" y="4691314"/>
-            <a:ext cx="1363579" cy="810126"/>
+            <a:off x="1923207" y="2084645"/>
+            <a:ext cx="8987269" cy="3605374"/>
+            <a:chOff x="1923207" y="2084645"/>
+            <a:chExt cx="8987269" cy="3605374"/>
           </a:xfrm>
-          <a:prstGeom prst="flowChartInputOutput">
-            <a:avLst/>
-          </a:prstGeom>
-        </p:spPr>
-        <p:style>
-          <a:lnRef idx="2">
-            <a:schemeClr val="accent1">
-              <a:shade val="50000"/>
-            </a:schemeClr>
-          </a:lnRef>
-          <a:fillRef idx="1">
-            <a:schemeClr val="accent1"/>
-          </a:fillRef>
-          <a:effectRef idx="0">
-            <a:schemeClr val="accent1"/>
-          </a:effectRef>
-          <a:fontRef idx="minor">
-            <a:schemeClr val="lt1"/>
-          </a:fontRef>
-        </p:style>
-        <p:txBody>
-          <a:bodyPr rtlCol="0" anchor="ctr"/>
-          <a:lstStyle/>
-          <a:p>
-            <a:pPr algn="ctr"/>
-            <a:r>
-              <a:rPr lang="en-GB" dirty="0"/>
-              <a:t>Omics Data</a:t>
-            </a:r>
-          </a:p>
-        </p:txBody>
-      </p:sp>
-      <p:sp>
-        <p:nvSpPr>
-          <p:cNvPr id="5" name="Flowchart: Process 4">
-            <a:extLst>
-              <a:ext uri="{FF2B5EF4-FFF2-40B4-BE49-F238E27FC236}">
-                <a16:creationId xmlns:a16="http://schemas.microsoft.com/office/drawing/2014/main" id="{3FAA41D5-B003-442E-92CD-C295620EDC20}"/>
-              </a:ext>
-            </a:extLst>
-          </p:cNvPr>
-          <p:cNvSpPr/>
-          <p:nvPr/>
-        </p:nvSpPr>
-        <p:spPr>
-          <a:xfrm>
-            <a:off x="4122821" y="1942013"/>
-            <a:ext cx="3946358" cy="1582237"/>
-          </a:xfrm>
-          <a:prstGeom prst="flowChartProcess">
-            <a:avLst/>
-          </a:prstGeom>
-        </p:spPr>
-        <p:style>
-          <a:lnRef idx="2">
-            <a:schemeClr val="accent1">
-              <a:shade val="50000"/>
-            </a:schemeClr>
-          </a:lnRef>
-          <a:fillRef idx="1">
-            <a:schemeClr val="accent1"/>
-          </a:fillRef>
-          <a:effectRef idx="0">
-            <a:schemeClr val="accent1"/>
-          </a:effectRef>
-          <a:fontRef idx="minor">
-            <a:schemeClr val="lt1"/>
-          </a:fontRef>
-        </p:style>
-        <p:txBody>
-          <a:bodyPr rtlCol="0" anchor="ctr"/>
-          <a:lstStyle/>
-          <a:p>
-            <a:pPr algn="ctr"/>
-            <a:r>
-              <a:rPr lang="en-GB" dirty="0"/>
-              <a:t>Static resources:</a:t>
-            </a:r>
-          </a:p>
-          <a:p>
-            <a:pPr algn="ctr"/>
-            <a:r>
-              <a:rPr lang="en-GB" dirty="0" err="1"/>
-              <a:t>Swissprot</a:t>
-            </a:r>
-            <a:r>
-              <a:rPr lang="en-GB" dirty="0"/>
-              <a:t> to Pathway map</a:t>
-            </a:r>
-          </a:p>
-          <a:p>
-            <a:pPr algn="ctr"/>
-            <a:r>
-              <a:rPr lang="en-GB" dirty="0" err="1"/>
-              <a:t>Snp</a:t>
-            </a:r>
-            <a:r>
-              <a:rPr lang="en-GB" dirty="0"/>
-              <a:t> to </a:t>
-            </a:r>
-            <a:r>
-              <a:rPr lang="en-GB" dirty="0" err="1"/>
-              <a:t>Swissprot</a:t>
-            </a:r>
-            <a:r>
-              <a:rPr lang="en-GB" dirty="0"/>
-              <a:t> map</a:t>
-            </a:r>
-          </a:p>
-          <a:p>
-            <a:pPr algn="ctr"/>
-            <a:r>
-              <a:rPr lang="en-GB" dirty="0"/>
-              <a:t>Reactome Annotated proteins </a:t>
-            </a:r>
-            <a:r>
-              <a:rPr lang="en-GB" dirty="0" err="1"/>
-              <a:t>Fasta</a:t>
-            </a:r>
-            <a:r>
-              <a:rPr lang="en-GB" dirty="0"/>
-              <a:t> file</a:t>
-            </a:r>
-          </a:p>
-          <a:p>
-            <a:pPr algn="ctr"/>
-            <a:endParaRPr lang="en-GB" dirty="0"/>
-          </a:p>
-        </p:txBody>
-      </p:sp>
-      <p:sp>
-        <p:nvSpPr>
-          <p:cNvPr id="6" name="Flowchart: Data 5">
-            <a:extLst>
-              <a:ext uri="{FF2B5EF4-FFF2-40B4-BE49-F238E27FC236}">
-                <a16:creationId xmlns:a16="http://schemas.microsoft.com/office/drawing/2014/main" id="{3871FF2F-2A2C-4CE1-A8EF-FECCC19CB941}"/>
-              </a:ext>
-            </a:extLst>
-          </p:cNvPr>
-          <p:cNvSpPr/>
-          <p:nvPr/>
-        </p:nvSpPr>
-        <p:spPr>
-          <a:xfrm>
-            <a:off x="8993104" y="4454650"/>
-            <a:ext cx="2005263" cy="1141079"/>
-          </a:xfrm>
-          <a:prstGeom prst="flowChartInputOutput">
-            <a:avLst/>
-          </a:prstGeom>
-        </p:spPr>
-        <p:style>
-          <a:lnRef idx="2">
-            <a:schemeClr val="accent1">
-              <a:shade val="50000"/>
-            </a:schemeClr>
-          </a:lnRef>
-          <a:fillRef idx="1">
-            <a:schemeClr val="accent1"/>
-          </a:fillRef>
-          <a:effectRef idx="0">
-            <a:schemeClr val="accent1"/>
-          </a:effectRef>
-          <a:fontRef idx="minor">
-            <a:schemeClr val="lt1"/>
-          </a:fontRef>
-        </p:style>
-        <p:txBody>
-          <a:bodyPr rtlCol="0" anchor="ctr"/>
-          <a:lstStyle/>
-          <a:p>
-            <a:pPr algn="ctr"/>
-            <a:r>
-              <a:rPr lang="en-GB" dirty="0"/>
-              <a:t>Reactions and Pathways</a:t>
-            </a:r>
-          </a:p>
-        </p:txBody>
-      </p:sp>
-      <p:sp>
-        <p:nvSpPr>
-          <p:cNvPr id="7" name="Arrow: Right 6">
-            <a:extLst>
-              <a:ext uri="{FF2B5EF4-FFF2-40B4-BE49-F238E27FC236}">
-                <a16:creationId xmlns:a16="http://schemas.microsoft.com/office/drawing/2014/main" id="{3C4F03D3-F3DF-474C-8EE7-8635F792A13B}"/>
-              </a:ext>
-            </a:extLst>
-          </p:cNvPr>
-          <p:cNvSpPr/>
-          <p:nvPr/>
-        </p:nvSpPr>
-        <p:spPr>
-          <a:xfrm>
-            <a:off x="3297279" y="4859756"/>
-            <a:ext cx="529390" cy="473242"/>
-          </a:xfrm>
-          <a:prstGeom prst="rightArrow">
-            <a:avLst/>
-          </a:prstGeom>
-        </p:spPr>
-        <p:style>
-          <a:lnRef idx="2">
-            <a:schemeClr val="accent1">
-              <a:shade val="50000"/>
-            </a:schemeClr>
-          </a:lnRef>
-          <a:fillRef idx="1">
-            <a:schemeClr val="accent1"/>
-          </a:fillRef>
-          <a:effectRef idx="0">
-            <a:schemeClr val="accent1"/>
-          </a:effectRef>
-          <a:fontRef idx="minor">
-            <a:schemeClr val="lt1"/>
-          </a:fontRef>
-        </p:style>
-        <p:txBody>
-          <a:bodyPr rtlCol="0" anchor="ctr"/>
-          <a:lstStyle/>
-          <a:p>
-            <a:pPr algn="ctr"/>
-            <a:endParaRPr lang="en-GB"/>
-          </a:p>
-        </p:txBody>
-      </p:sp>
-      <p:sp>
-        <p:nvSpPr>
-          <p:cNvPr id="8" name="Arrow: Right 7">
-            <a:extLst>
-              <a:ext uri="{FF2B5EF4-FFF2-40B4-BE49-F238E27FC236}">
-                <a16:creationId xmlns:a16="http://schemas.microsoft.com/office/drawing/2014/main" id="{0B536E99-2307-4B03-9029-34710375B76F}"/>
-              </a:ext>
-            </a:extLst>
-          </p:cNvPr>
-          <p:cNvSpPr/>
-          <p:nvPr/>
-        </p:nvSpPr>
-        <p:spPr>
-          <a:xfrm>
-            <a:off x="8247146" y="4788569"/>
-            <a:ext cx="529390" cy="473242"/>
-          </a:xfrm>
-          <a:prstGeom prst="rightArrow">
-            <a:avLst/>
-          </a:prstGeom>
-        </p:spPr>
-        <p:style>
-          <a:lnRef idx="2">
-            <a:schemeClr val="accent1">
-              <a:shade val="50000"/>
-            </a:schemeClr>
-          </a:lnRef>
-          <a:fillRef idx="1">
-            <a:schemeClr val="accent1"/>
-          </a:fillRef>
-          <a:effectRef idx="0">
-            <a:schemeClr val="accent1"/>
-          </a:effectRef>
-          <a:fontRef idx="minor">
-            <a:schemeClr val="lt1"/>
-          </a:fontRef>
-        </p:style>
-        <p:txBody>
-          <a:bodyPr rtlCol="0" anchor="ctr"/>
-          <a:lstStyle/>
-          <a:p>
-            <a:pPr algn="ctr"/>
-            <a:endParaRPr lang="en-GB"/>
-          </a:p>
-        </p:txBody>
-      </p:sp>
-      <p:sp>
-        <p:nvSpPr>
-          <p:cNvPr id="9" name="Arrow: Right 8">
-            <a:extLst>
-              <a:ext uri="{FF2B5EF4-FFF2-40B4-BE49-F238E27FC236}">
-                <a16:creationId xmlns:a16="http://schemas.microsoft.com/office/drawing/2014/main" id="{A21351A8-9C2B-4B13-893D-5246FF10D79B}"/>
-              </a:ext>
-            </a:extLst>
-          </p:cNvPr>
-          <p:cNvSpPr/>
-          <p:nvPr/>
-        </p:nvSpPr>
-        <p:spPr>
-          <a:xfrm rot="5400000">
-            <a:off x="5831305" y="3764673"/>
-            <a:ext cx="529390" cy="473242"/>
-          </a:xfrm>
-          <a:prstGeom prst="rightArrow">
-            <a:avLst/>
-          </a:prstGeom>
-        </p:spPr>
-        <p:style>
-          <a:lnRef idx="2">
-            <a:schemeClr val="accent1">
-              <a:shade val="50000"/>
-            </a:schemeClr>
-          </a:lnRef>
-          <a:fillRef idx="1">
-            <a:schemeClr val="accent1"/>
-          </a:fillRef>
-          <a:effectRef idx="0">
-            <a:schemeClr val="accent1"/>
-          </a:effectRef>
-          <a:fontRef idx="minor">
-            <a:schemeClr val="lt1"/>
-          </a:fontRef>
-        </p:style>
-        <p:txBody>
-          <a:bodyPr rtlCol="0" anchor="ctr"/>
-          <a:lstStyle/>
-          <a:p>
-            <a:pPr algn="ctr"/>
-            <a:endParaRPr lang="en-GB"/>
-          </a:p>
-        </p:txBody>
-      </p:sp>
-      <p:sp>
-        <p:nvSpPr>
-          <p:cNvPr id="10" name="Flowchart: Process 9">
-            <a:extLst>
-              <a:ext uri="{FF2B5EF4-FFF2-40B4-BE49-F238E27FC236}">
-                <a16:creationId xmlns:a16="http://schemas.microsoft.com/office/drawing/2014/main" id="{5F26957D-2A3A-40CF-AAC8-5ECFCF67EB56}"/>
-              </a:ext>
-            </a:extLst>
-          </p:cNvPr>
-          <p:cNvSpPr/>
-          <p:nvPr/>
-        </p:nvSpPr>
-        <p:spPr>
-          <a:xfrm>
-            <a:off x="4619625" y="4548940"/>
-            <a:ext cx="2952750" cy="952500"/>
-          </a:xfrm>
-          <a:prstGeom prst="flowChartProcess">
-            <a:avLst/>
-          </a:prstGeom>
-        </p:spPr>
-        <p:style>
-          <a:lnRef idx="2">
-            <a:schemeClr val="accent1">
-              <a:shade val="50000"/>
-            </a:schemeClr>
-          </a:lnRef>
-          <a:fillRef idx="1">
-            <a:schemeClr val="accent1"/>
-          </a:fillRef>
-          <a:effectRef idx="0">
-            <a:schemeClr val="accent1"/>
-          </a:effectRef>
-          <a:fontRef idx="minor">
-            <a:schemeClr val="lt1"/>
-          </a:fontRef>
-        </p:style>
-        <p:txBody>
-          <a:bodyPr rtlCol="0" anchor="ctr"/>
-          <a:lstStyle/>
-          <a:p>
-            <a:pPr algn="ctr"/>
-            <a:r>
-              <a:rPr lang="en-GB" dirty="0"/>
-              <a:t>Filter static </a:t>
-            </a:r>
-            <a:r>
-              <a:rPr lang="en-GB" dirty="0" err="1"/>
-              <a:t>resuources</a:t>
-            </a:r>
-            <a:endParaRPr lang="en-GB" dirty="0"/>
-          </a:p>
-        </p:txBody>
-      </p:sp>
+        </p:grpSpPr>
+        <p:sp>
+          <p:nvSpPr>
+            <p:cNvPr id="4" name="Flowchart: Data 3">
+              <a:extLst>
+                <a:ext uri="{FF2B5EF4-FFF2-40B4-BE49-F238E27FC236}">
+                  <a16:creationId xmlns:a16="http://schemas.microsoft.com/office/drawing/2014/main" id="{613C46D4-C182-49C8-9EB4-4CCED1DA454E}"/>
+                </a:ext>
+              </a:extLst>
+            </p:cNvPr>
+            <p:cNvSpPr/>
+            <p:nvPr/>
+          </p:nvSpPr>
+          <p:spPr>
+            <a:xfrm>
+              <a:off x="1923207" y="4691314"/>
+              <a:ext cx="1363579" cy="810126"/>
+            </a:xfrm>
+            <a:prstGeom prst="flowChartInputOutput">
+              <a:avLst/>
+            </a:prstGeom>
+          </p:spPr>
+          <p:style>
+            <a:lnRef idx="2">
+              <a:schemeClr val="accent1">
+                <a:shade val="50000"/>
+              </a:schemeClr>
+            </a:lnRef>
+            <a:fillRef idx="1">
+              <a:schemeClr val="accent1"/>
+            </a:fillRef>
+            <a:effectRef idx="0">
+              <a:schemeClr val="accent1"/>
+            </a:effectRef>
+            <a:fontRef idx="minor">
+              <a:schemeClr val="lt1"/>
+            </a:fontRef>
+          </p:style>
+          <p:txBody>
+            <a:bodyPr rtlCol="0" anchor="ctr"/>
+            <a:lstStyle/>
+            <a:p>
+              <a:pPr algn="ctr"/>
+              <a:r>
+                <a:rPr lang="en-GB" dirty="0"/>
+                <a:t>Omics Data</a:t>
+              </a:r>
+            </a:p>
+          </p:txBody>
+        </p:sp>
+        <p:sp>
+          <p:nvSpPr>
+            <p:cNvPr id="5" name="Flowchart: Process 4">
+              <a:extLst>
+                <a:ext uri="{FF2B5EF4-FFF2-40B4-BE49-F238E27FC236}">
+                  <a16:creationId xmlns:a16="http://schemas.microsoft.com/office/drawing/2014/main" id="{3FAA41D5-B003-442E-92CD-C295620EDC20}"/>
+                </a:ext>
+              </a:extLst>
+            </p:cNvPr>
+            <p:cNvSpPr/>
+            <p:nvPr/>
+          </p:nvSpPr>
+          <p:spPr>
+            <a:xfrm>
+              <a:off x="3286786" y="2552262"/>
+              <a:ext cx="5618427" cy="952500"/>
+            </a:xfrm>
+            <a:prstGeom prst="flowChartProcess">
+              <a:avLst/>
+            </a:prstGeom>
+          </p:spPr>
+          <p:style>
+            <a:lnRef idx="2">
+              <a:schemeClr val="accent1">
+                <a:shade val="50000"/>
+              </a:schemeClr>
+            </a:lnRef>
+            <a:fillRef idx="1">
+              <a:schemeClr val="accent1"/>
+            </a:fillRef>
+            <a:effectRef idx="0">
+              <a:schemeClr val="accent1"/>
+            </a:effectRef>
+            <a:fontRef idx="minor">
+              <a:schemeClr val="lt1"/>
+            </a:fontRef>
+          </p:style>
+          <p:txBody>
+            <a:bodyPr rtlCol="0" anchor="ctr"/>
+            <a:lstStyle/>
+            <a:p>
+              <a:pPr algn="ctr"/>
+              <a:endParaRPr lang="en-GB" dirty="0"/>
+            </a:p>
+            <a:p>
+              <a:pPr algn="ctr"/>
+              <a:r>
+                <a:rPr lang="en-GB" dirty="0"/>
+                <a:t>Map from Proteins &amp; Proteoforms to Reactome Pathways</a:t>
+              </a:r>
+            </a:p>
+            <a:p>
+              <a:pPr algn="ctr"/>
+              <a:r>
+                <a:rPr lang="en-GB" dirty="0"/>
+                <a:t>Map from </a:t>
+              </a:r>
+              <a:r>
+                <a:rPr lang="en-GB" dirty="0" err="1"/>
+                <a:t>Snp</a:t>
+              </a:r>
+              <a:r>
+                <a:rPr lang="en-GB" dirty="0"/>
+                <a:t> to Proteins</a:t>
+              </a:r>
+            </a:p>
+            <a:p>
+              <a:pPr algn="ctr"/>
+              <a:r>
+                <a:rPr lang="en-GB" dirty="0"/>
+                <a:t>Swiss-</a:t>
+              </a:r>
+              <a:r>
+                <a:rPr lang="en-GB" dirty="0" err="1"/>
+                <a:t>Prot</a:t>
+              </a:r>
+              <a:r>
+                <a:rPr lang="en-GB" dirty="0"/>
+                <a:t> proteins </a:t>
+              </a:r>
+              <a:r>
+                <a:rPr lang="en-GB" dirty="0" err="1"/>
+                <a:t>Fasta</a:t>
+              </a:r>
+              <a:endParaRPr lang="en-GB" dirty="0"/>
+            </a:p>
+            <a:p>
+              <a:pPr algn="ctr"/>
+              <a:endParaRPr lang="en-GB" dirty="0"/>
+            </a:p>
+          </p:txBody>
+        </p:sp>
+        <p:sp>
+          <p:nvSpPr>
+            <p:cNvPr id="6" name="Flowchart: Data 5">
+              <a:extLst>
+                <a:ext uri="{FF2B5EF4-FFF2-40B4-BE49-F238E27FC236}">
+                  <a16:creationId xmlns:a16="http://schemas.microsoft.com/office/drawing/2014/main" id="{3871FF2F-2A2C-4CE1-A8EF-FECCC19CB941}"/>
+                </a:ext>
+              </a:extLst>
+            </p:cNvPr>
+            <p:cNvSpPr/>
+            <p:nvPr/>
+          </p:nvSpPr>
+          <p:spPr>
+            <a:xfrm>
+              <a:off x="8905213" y="4548940"/>
+              <a:ext cx="2005263" cy="1141079"/>
+            </a:xfrm>
+            <a:prstGeom prst="flowChartInputOutput">
+              <a:avLst/>
+            </a:prstGeom>
+          </p:spPr>
+          <p:style>
+            <a:lnRef idx="2">
+              <a:schemeClr val="accent1">
+                <a:shade val="50000"/>
+              </a:schemeClr>
+            </a:lnRef>
+            <a:fillRef idx="1">
+              <a:schemeClr val="accent1"/>
+            </a:fillRef>
+            <a:effectRef idx="0">
+              <a:schemeClr val="accent1"/>
+            </a:effectRef>
+            <a:fontRef idx="minor">
+              <a:schemeClr val="lt1"/>
+            </a:fontRef>
+          </p:style>
+          <p:txBody>
+            <a:bodyPr rtlCol="0" anchor="ctr"/>
+            <a:lstStyle/>
+            <a:p>
+              <a:pPr algn="ctr"/>
+              <a:r>
+                <a:rPr lang="en-GB" dirty="0"/>
+                <a:t>Reactions and Pathways</a:t>
+              </a:r>
+            </a:p>
+          </p:txBody>
+        </p:sp>
+        <p:sp>
+          <p:nvSpPr>
+            <p:cNvPr id="7" name="Arrow: Right 6">
+              <a:extLst>
+                <a:ext uri="{FF2B5EF4-FFF2-40B4-BE49-F238E27FC236}">
+                  <a16:creationId xmlns:a16="http://schemas.microsoft.com/office/drawing/2014/main" id="{3C4F03D3-F3DF-474C-8EE7-8635F792A13B}"/>
+                </a:ext>
+              </a:extLst>
+            </p:cNvPr>
+            <p:cNvSpPr/>
+            <p:nvPr/>
+          </p:nvSpPr>
+          <p:spPr>
+            <a:xfrm>
+              <a:off x="3653710" y="4859755"/>
+              <a:ext cx="529390" cy="473242"/>
+            </a:xfrm>
+            <a:prstGeom prst="rightArrow">
+              <a:avLst/>
+            </a:prstGeom>
+          </p:spPr>
+          <p:style>
+            <a:lnRef idx="2">
+              <a:schemeClr val="accent1">
+                <a:shade val="50000"/>
+              </a:schemeClr>
+            </a:lnRef>
+            <a:fillRef idx="1">
+              <a:schemeClr val="accent1"/>
+            </a:fillRef>
+            <a:effectRef idx="0">
+              <a:schemeClr val="accent1"/>
+            </a:effectRef>
+            <a:fontRef idx="minor">
+              <a:schemeClr val="lt1"/>
+            </a:fontRef>
+          </p:style>
+          <p:txBody>
+            <a:bodyPr rtlCol="0" anchor="ctr"/>
+            <a:lstStyle/>
+            <a:p>
+              <a:pPr algn="ctr"/>
+              <a:endParaRPr lang="en-GB"/>
+            </a:p>
+          </p:txBody>
+        </p:sp>
+        <p:sp>
+          <p:nvSpPr>
+            <p:cNvPr id="8" name="Arrow: Right 7">
+              <a:extLst>
+                <a:ext uri="{FF2B5EF4-FFF2-40B4-BE49-F238E27FC236}">
+                  <a16:creationId xmlns:a16="http://schemas.microsoft.com/office/drawing/2014/main" id="{0B536E99-2307-4B03-9029-34710375B76F}"/>
+                </a:ext>
+              </a:extLst>
+            </p:cNvPr>
+            <p:cNvSpPr/>
+            <p:nvPr/>
+          </p:nvSpPr>
+          <p:spPr>
+            <a:xfrm>
+              <a:off x="8008900" y="4859755"/>
+              <a:ext cx="529390" cy="473242"/>
+            </a:xfrm>
+            <a:prstGeom prst="rightArrow">
+              <a:avLst/>
+            </a:prstGeom>
+          </p:spPr>
+          <p:style>
+            <a:lnRef idx="2">
+              <a:schemeClr val="accent1">
+                <a:shade val="50000"/>
+              </a:schemeClr>
+            </a:lnRef>
+            <a:fillRef idx="1">
+              <a:schemeClr val="accent1"/>
+            </a:fillRef>
+            <a:effectRef idx="0">
+              <a:schemeClr val="accent1"/>
+            </a:effectRef>
+            <a:fontRef idx="minor">
+              <a:schemeClr val="lt1"/>
+            </a:fontRef>
+          </p:style>
+          <p:txBody>
+            <a:bodyPr rtlCol="0" anchor="ctr"/>
+            <a:lstStyle/>
+            <a:p>
+              <a:pPr algn="ctr"/>
+              <a:endParaRPr lang="en-GB"/>
+            </a:p>
+          </p:txBody>
+        </p:sp>
+        <p:sp>
+          <p:nvSpPr>
+            <p:cNvPr id="9" name="Arrow: Right 8">
+              <a:extLst>
+                <a:ext uri="{FF2B5EF4-FFF2-40B4-BE49-F238E27FC236}">
+                  <a16:creationId xmlns:a16="http://schemas.microsoft.com/office/drawing/2014/main" id="{A21351A8-9C2B-4B13-893D-5246FF10D79B}"/>
+                </a:ext>
+              </a:extLst>
+            </p:cNvPr>
+            <p:cNvSpPr/>
+            <p:nvPr/>
+          </p:nvSpPr>
+          <p:spPr>
+            <a:xfrm rot="5400000">
+              <a:off x="5831305" y="3764673"/>
+              <a:ext cx="529390" cy="473242"/>
+            </a:xfrm>
+            <a:prstGeom prst="rightArrow">
+              <a:avLst/>
+            </a:prstGeom>
+          </p:spPr>
+          <p:style>
+            <a:lnRef idx="2">
+              <a:schemeClr val="accent1">
+                <a:shade val="50000"/>
+              </a:schemeClr>
+            </a:lnRef>
+            <a:fillRef idx="1">
+              <a:schemeClr val="accent1"/>
+            </a:fillRef>
+            <a:effectRef idx="0">
+              <a:schemeClr val="accent1"/>
+            </a:effectRef>
+            <a:fontRef idx="minor">
+              <a:schemeClr val="lt1"/>
+            </a:fontRef>
+          </p:style>
+          <p:txBody>
+            <a:bodyPr rtlCol="0" anchor="ctr"/>
+            <a:lstStyle/>
+            <a:p>
+              <a:pPr algn="ctr"/>
+              <a:endParaRPr lang="en-GB"/>
+            </a:p>
+          </p:txBody>
+        </p:sp>
+        <p:sp>
+          <p:nvSpPr>
+            <p:cNvPr id="10" name="Flowchart: Process 9">
+              <a:extLst>
+                <a:ext uri="{FF2B5EF4-FFF2-40B4-BE49-F238E27FC236}">
+                  <a16:creationId xmlns:a16="http://schemas.microsoft.com/office/drawing/2014/main" id="{5F26957D-2A3A-40CF-AAC8-5ECFCF67EB56}"/>
+                </a:ext>
+              </a:extLst>
+            </p:cNvPr>
+            <p:cNvSpPr/>
+            <p:nvPr/>
+          </p:nvSpPr>
+          <p:spPr>
+            <a:xfrm>
+              <a:off x="4619625" y="4548940"/>
+              <a:ext cx="2952750" cy="952500"/>
+            </a:xfrm>
+            <a:prstGeom prst="flowChartProcess">
+              <a:avLst/>
+            </a:prstGeom>
+          </p:spPr>
+          <p:style>
+            <a:lnRef idx="2">
+              <a:schemeClr val="accent1">
+                <a:shade val="50000"/>
+              </a:schemeClr>
+            </a:lnRef>
+            <a:fillRef idx="1">
+              <a:schemeClr val="accent1"/>
+            </a:fillRef>
+            <a:effectRef idx="0">
+              <a:schemeClr val="accent1"/>
+            </a:effectRef>
+            <a:fontRef idx="minor">
+              <a:schemeClr val="lt1"/>
+            </a:fontRef>
+          </p:style>
+          <p:txBody>
+            <a:bodyPr rtlCol="0" anchor="ctr"/>
+            <a:lstStyle/>
+            <a:p>
+              <a:pPr algn="ctr"/>
+              <a:r>
+                <a:rPr lang="en-GB" dirty="0"/>
+                <a:t>Filter static resources</a:t>
+              </a:r>
+            </a:p>
+          </p:txBody>
+        </p:sp>
+        <p:sp>
+          <p:nvSpPr>
+            <p:cNvPr id="3" name="TextBox 2">
+              <a:extLst>
+                <a:ext uri="{FF2B5EF4-FFF2-40B4-BE49-F238E27FC236}">
+                  <a16:creationId xmlns:a16="http://schemas.microsoft.com/office/drawing/2014/main" id="{5AF930A2-B9AC-4F93-AA12-6938DF8175F7}"/>
+                </a:ext>
+              </a:extLst>
+            </p:cNvPr>
+            <p:cNvSpPr txBox="1"/>
+            <p:nvPr/>
+          </p:nvSpPr>
+          <p:spPr>
+            <a:xfrm>
+              <a:off x="5266350" y="2084645"/>
+              <a:ext cx="1659300" cy="369332"/>
+            </a:xfrm>
+            <a:prstGeom prst="rect">
+              <a:avLst/>
+            </a:prstGeom>
+            <a:noFill/>
+          </p:spPr>
+          <p:txBody>
+            <a:bodyPr wrap="none" rtlCol="0">
+              <a:spAutoFit/>
+            </a:bodyPr>
+            <a:lstStyle/>
+            <a:p>
+              <a:r>
+                <a:rPr lang="en-GB" dirty="0"/>
+                <a:t>Static resources</a:t>
+              </a:r>
+            </a:p>
+          </p:txBody>
+        </p:sp>
+        <p:sp>
+          <p:nvSpPr>
+            <p:cNvPr id="11" name="TextBox 10">
+              <a:extLst>
+                <a:ext uri="{FF2B5EF4-FFF2-40B4-BE49-F238E27FC236}">
+                  <a16:creationId xmlns:a16="http://schemas.microsoft.com/office/drawing/2014/main" id="{F72A5787-7A56-4EC6-9A71-DC4C4A516690}"/>
+                </a:ext>
+              </a:extLst>
+            </p:cNvPr>
+            <p:cNvSpPr txBox="1"/>
+            <p:nvPr/>
+          </p:nvSpPr>
+          <p:spPr>
+            <a:xfrm>
+              <a:off x="2262594" y="4179608"/>
+              <a:ext cx="684803" cy="369332"/>
+            </a:xfrm>
+            <a:prstGeom prst="rect">
+              <a:avLst/>
+            </a:prstGeom>
+            <a:noFill/>
+          </p:spPr>
+          <p:txBody>
+            <a:bodyPr wrap="none" rtlCol="0">
+              <a:spAutoFit/>
+            </a:bodyPr>
+            <a:lstStyle/>
+            <a:p>
+              <a:r>
+                <a:rPr lang="en-GB" dirty="0"/>
+                <a:t>Input</a:t>
+              </a:r>
+            </a:p>
+          </p:txBody>
+        </p:sp>
+        <p:sp>
+          <p:nvSpPr>
+            <p:cNvPr id="12" name="TextBox 11">
+              <a:extLst>
+                <a:ext uri="{FF2B5EF4-FFF2-40B4-BE49-F238E27FC236}">
+                  <a16:creationId xmlns:a16="http://schemas.microsoft.com/office/drawing/2014/main" id="{1454069B-5864-41FA-B63A-67AC89B390F3}"/>
+                </a:ext>
+              </a:extLst>
+            </p:cNvPr>
+            <p:cNvSpPr txBox="1"/>
+            <p:nvPr/>
+          </p:nvSpPr>
+          <p:spPr>
+            <a:xfrm>
+              <a:off x="9628032" y="4179608"/>
+              <a:ext cx="856325" cy="369332"/>
+            </a:xfrm>
+            <a:prstGeom prst="rect">
+              <a:avLst/>
+            </a:prstGeom>
+            <a:noFill/>
+          </p:spPr>
+          <p:txBody>
+            <a:bodyPr wrap="none" rtlCol="0">
+              <a:spAutoFit/>
+            </a:bodyPr>
+            <a:lstStyle/>
+            <a:p>
+              <a:r>
+                <a:rPr lang="en-GB" dirty="0"/>
+                <a:t>Output</a:t>
+              </a:r>
+            </a:p>
+          </p:txBody>
+        </p:sp>
+      </p:grpSp>
     </p:spTree>
     <p:extLst>
       <p:ext uri="{BB962C8B-B14F-4D97-AF65-F5344CB8AC3E}">
@@ -4650,6 +4767,619 @@
     <p:extLst>
       <p:ext uri="{BB962C8B-B14F-4D97-AF65-F5344CB8AC3E}">
         <p14:creationId xmlns:p14="http://schemas.microsoft.com/office/powerpoint/2010/main" val="2428170653"/>
+      </p:ext>
+    </p:extLst>
+  </p:cSld>
+  <p:clrMapOvr>
+    <a:masterClrMapping/>
+  </p:clrMapOvr>
+</p:sld>
+</file>
+
+<file path=ppt/slides/slide5.xml><?xml version="1.0" encoding="utf-8"?>
+<p:sld xmlns:a="http://schemas.openxmlformats.org/drawingml/2006/main" xmlns:r="http://schemas.openxmlformats.org/officeDocument/2006/relationships" xmlns:p="http://schemas.openxmlformats.org/presentationml/2006/main">
+  <p:cSld>
+    <p:spTree>
+      <p:nvGrpSpPr>
+        <p:cNvPr id="1" name=""/>
+        <p:cNvGrpSpPr/>
+        <p:nvPr/>
+      </p:nvGrpSpPr>
+      <p:grpSpPr>
+        <a:xfrm>
+          <a:off x="0" y="0"/>
+          <a:ext cx="0" cy="0"/>
+          <a:chOff x="0" y="0"/>
+          <a:chExt cx="0" cy="0"/>
+        </a:xfrm>
+      </p:grpSpPr>
+      <p:sp>
+        <p:nvSpPr>
+          <p:cNvPr id="2" name="Title 1">
+            <a:extLst>
+              <a:ext uri="{FF2B5EF4-FFF2-40B4-BE49-F238E27FC236}">
+                <a16:creationId xmlns:a16="http://schemas.microsoft.com/office/drawing/2014/main" id="{FCF67970-C05E-4B41-82A0-B882EBC7031B}"/>
+              </a:ext>
+            </a:extLst>
+          </p:cNvPr>
+          <p:cNvSpPr>
+            <a:spLocks noGrp="1"/>
+          </p:cNvSpPr>
+          <p:nvPr>
+            <p:ph type="title"/>
+          </p:nvPr>
+        </p:nvSpPr>
+        <p:spPr/>
+        <p:txBody>
+          <a:bodyPr/>
+          <a:lstStyle/>
+          <a:p>
+            <a:r>
+              <a:rPr lang="en-GB" dirty="0"/>
+              <a:t>Data conversion</a:t>
+            </a:r>
+          </a:p>
+        </p:txBody>
+      </p:sp>
+      <p:sp>
+        <p:nvSpPr>
+          <p:cNvPr id="5" name="TextBox 4">
+            <a:extLst>
+              <a:ext uri="{FF2B5EF4-FFF2-40B4-BE49-F238E27FC236}">
+                <a16:creationId xmlns:a16="http://schemas.microsoft.com/office/drawing/2014/main" id="{01228489-03B4-4D65-88E6-3A4DD8FB244C}"/>
+              </a:ext>
+            </a:extLst>
+          </p:cNvPr>
+          <p:cNvSpPr txBox="1"/>
+          <p:nvPr/>
+        </p:nvSpPr>
+        <p:spPr>
+          <a:xfrm>
+            <a:off x="3394630" y="2696492"/>
+            <a:ext cx="558166" cy="369332"/>
+          </a:xfrm>
+          <a:prstGeom prst="rect">
+            <a:avLst/>
+          </a:prstGeom>
+          <a:noFill/>
+        </p:spPr>
+        <p:txBody>
+          <a:bodyPr wrap="none" rtlCol="0">
+            <a:spAutoFit/>
+          </a:bodyPr>
+          <a:lstStyle/>
+          <a:p>
+            <a:r>
+              <a:rPr lang="en-GB" dirty="0"/>
+              <a:t>SNP</a:t>
+            </a:r>
+          </a:p>
+        </p:txBody>
+      </p:sp>
+      <p:sp>
+        <p:nvSpPr>
+          <p:cNvPr id="6" name="TextBox 5">
+            <a:extLst>
+              <a:ext uri="{FF2B5EF4-FFF2-40B4-BE49-F238E27FC236}">
+                <a16:creationId xmlns:a16="http://schemas.microsoft.com/office/drawing/2014/main" id="{86FFE9F6-A2BD-4EB3-8584-A97618C52BF3}"/>
+              </a:ext>
+            </a:extLst>
+          </p:cNvPr>
+          <p:cNvSpPr txBox="1"/>
+          <p:nvPr/>
+        </p:nvSpPr>
+        <p:spPr>
+          <a:xfrm>
+            <a:off x="3177841" y="3657600"/>
+            <a:ext cx="991746" cy="369332"/>
+          </a:xfrm>
+          <a:prstGeom prst="rect">
+            <a:avLst/>
+          </a:prstGeom>
+          <a:noFill/>
+        </p:spPr>
+        <p:txBody>
+          <a:bodyPr wrap="none" rtlCol="0">
+            <a:spAutoFit/>
+          </a:bodyPr>
+          <a:lstStyle/>
+          <a:p>
+            <a:r>
+              <a:rPr lang="en-GB" dirty="0"/>
+              <a:t>Peptides</a:t>
+            </a:r>
+          </a:p>
+        </p:txBody>
+      </p:sp>
+      <p:sp>
+        <p:nvSpPr>
+          <p:cNvPr id="7" name="TextBox 6">
+            <a:extLst>
+              <a:ext uri="{FF2B5EF4-FFF2-40B4-BE49-F238E27FC236}">
+                <a16:creationId xmlns:a16="http://schemas.microsoft.com/office/drawing/2014/main" id="{3680BDB7-8E75-4C2E-9503-C81BECE4E849}"/>
+              </a:ext>
+            </a:extLst>
+          </p:cNvPr>
+          <p:cNvSpPr txBox="1"/>
+          <p:nvPr/>
+        </p:nvSpPr>
+        <p:spPr>
+          <a:xfrm>
+            <a:off x="2724191" y="4584127"/>
+            <a:ext cx="1899046" cy="369332"/>
+          </a:xfrm>
+          <a:prstGeom prst="rect">
+            <a:avLst/>
+          </a:prstGeom>
+          <a:noFill/>
+        </p:spPr>
+        <p:txBody>
+          <a:bodyPr wrap="none" rtlCol="0">
+            <a:spAutoFit/>
+          </a:bodyPr>
+          <a:lstStyle/>
+          <a:p>
+            <a:r>
+              <a:rPr lang="en-GB" dirty="0"/>
+              <a:t>Modified Peptides</a:t>
+            </a:r>
+          </a:p>
+        </p:txBody>
+      </p:sp>
+      <p:sp>
+        <p:nvSpPr>
+          <p:cNvPr id="8" name="TextBox 7">
+            <a:extLst>
+              <a:ext uri="{FF2B5EF4-FFF2-40B4-BE49-F238E27FC236}">
+                <a16:creationId xmlns:a16="http://schemas.microsoft.com/office/drawing/2014/main" id="{DB84A4BA-3834-4DB7-BD30-E03A02C44181}"/>
+              </a:ext>
+            </a:extLst>
+          </p:cNvPr>
+          <p:cNvSpPr txBox="1"/>
+          <p:nvPr/>
+        </p:nvSpPr>
+        <p:spPr>
+          <a:xfrm>
+            <a:off x="3287229" y="3185928"/>
+            <a:ext cx="772969" cy="369332"/>
+          </a:xfrm>
+          <a:prstGeom prst="rect">
+            <a:avLst/>
+          </a:prstGeom>
+          <a:noFill/>
+        </p:spPr>
+        <p:txBody>
+          <a:bodyPr wrap="none" rtlCol="0">
+            <a:spAutoFit/>
+          </a:bodyPr>
+          <a:lstStyle/>
+          <a:p>
+            <a:r>
+              <a:rPr lang="en-GB" dirty="0"/>
+              <a:t>Genes</a:t>
+            </a:r>
+          </a:p>
+        </p:txBody>
+      </p:sp>
+      <p:sp>
+        <p:nvSpPr>
+          <p:cNvPr id="9" name="TextBox 8">
+            <a:extLst>
+              <a:ext uri="{FF2B5EF4-FFF2-40B4-BE49-F238E27FC236}">
+                <a16:creationId xmlns:a16="http://schemas.microsoft.com/office/drawing/2014/main" id="{23C510E2-9F59-466E-8097-8F3DB5230263}"/>
+              </a:ext>
+            </a:extLst>
+          </p:cNvPr>
+          <p:cNvSpPr txBox="1"/>
+          <p:nvPr/>
+        </p:nvSpPr>
+        <p:spPr>
+          <a:xfrm>
+            <a:off x="5702658" y="3244334"/>
+            <a:ext cx="955903" cy="369332"/>
+          </a:xfrm>
+          <a:prstGeom prst="rect">
+            <a:avLst/>
+          </a:prstGeom>
+          <a:noFill/>
+        </p:spPr>
+        <p:txBody>
+          <a:bodyPr wrap="none" rtlCol="0">
+            <a:spAutoFit/>
+          </a:bodyPr>
+          <a:lstStyle/>
+          <a:p>
+            <a:r>
+              <a:rPr lang="en-GB" dirty="0"/>
+              <a:t>Proteins</a:t>
+            </a:r>
+          </a:p>
+        </p:txBody>
+      </p:sp>
+      <p:sp>
+        <p:nvSpPr>
+          <p:cNvPr id="10" name="TextBox 9">
+            <a:extLst>
+              <a:ext uri="{FF2B5EF4-FFF2-40B4-BE49-F238E27FC236}">
+                <a16:creationId xmlns:a16="http://schemas.microsoft.com/office/drawing/2014/main" id="{A644A67D-118C-4766-817B-8A37A06C6C20}"/>
+              </a:ext>
+            </a:extLst>
+          </p:cNvPr>
+          <p:cNvSpPr txBox="1"/>
+          <p:nvPr/>
+        </p:nvSpPr>
+        <p:spPr>
+          <a:xfrm>
+            <a:off x="5597631" y="4569098"/>
+            <a:ext cx="1354986" cy="369332"/>
+          </a:xfrm>
+          <a:prstGeom prst="rect">
+            <a:avLst/>
+          </a:prstGeom>
+          <a:noFill/>
+        </p:spPr>
+        <p:txBody>
+          <a:bodyPr wrap="none" rtlCol="0">
+            <a:spAutoFit/>
+          </a:bodyPr>
+          <a:lstStyle/>
+          <a:p>
+            <a:r>
+              <a:rPr lang="en-GB" dirty="0"/>
+              <a:t>Proteoforms</a:t>
+            </a:r>
+          </a:p>
+        </p:txBody>
+      </p:sp>
+      <p:sp>
+        <p:nvSpPr>
+          <p:cNvPr id="11" name="TextBox 10">
+            <a:extLst>
+              <a:ext uri="{FF2B5EF4-FFF2-40B4-BE49-F238E27FC236}">
+                <a16:creationId xmlns:a16="http://schemas.microsoft.com/office/drawing/2014/main" id="{2874E7D2-0CAC-4AD3-9C60-9DD49AACAC75}"/>
+              </a:ext>
+            </a:extLst>
+          </p:cNvPr>
+          <p:cNvSpPr txBox="1"/>
+          <p:nvPr/>
+        </p:nvSpPr>
+        <p:spPr>
+          <a:xfrm>
+            <a:off x="7662673" y="3813061"/>
+            <a:ext cx="1092735" cy="369332"/>
+          </a:xfrm>
+          <a:prstGeom prst="rect">
+            <a:avLst/>
+          </a:prstGeom>
+          <a:noFill/>
+        </p:spPr>
+        <p:txBody>
+          <a:bodyPr wrap="none" rtlCol="0">
+            <a:spAutoFit/>
+          </a:bodyPr>
+          <a:lstStyle/>
+          <a:p>
+            <a:r>
+              <a:rPr lang="en-GB" dirty="0"/>
+              <a:t>Reactions</a:t>
+            </a:r>
+          </a:p>
+        </p:txBody>
+      </p:sp>
+      <p:sp>
+        <p:nvSpPr>
+          <p:cNvPr id="12" name="TextBox 11">
+            <a:extLst>
+              <a:ext uri="{FF2B5EF4-FFF2-40B4-BE49-F238E27FC236}">
+                <a16:creationId xmlns:a16="http://schemas.microsoft.com/office/drawing/2014/main" id="{9AF8A85F-A579-4F41-AD3A-9861AE5C7765}"/>
+              </a:ext>
+            </a:extLst>
+          </p:cNvPr>
+          <p:cNvSpPr txBox="1"/>
+          <p:nvPr/>
+        </p:nvSpPr>
+        <p:spPr>
+          <a:xfrm>
+            <a:off x="9619489" y="3808537"/>
+            <a:ext cx="1064715" cy="369332"/>
+          </a:xfrm>
+          <a:prstGeom prst="rect">
+            <a:avLst/>
+          </a:prstGeom>
+          <a:noFill/>
+        </p:spPr>
+        <p:txBody>
+          <a:bodyPr wrap="none" rtlCol="0">
+            <a:spAutoFit/>
+          </a:bodyPr>
+          <a:lstStyle/>
+          <a:p>
+            <a:r>
+              <a:rPr lang="en-GB" dirty="0"/>
+              <a:t>Pathways</a:t>
+            </a:r>
+          </a:p>
+        </p:txBody>
+      </p:sp>
+      <p:sp>
+        <p:nvSpPr>
+          <p:cNvPr id="13" name="Arrow: Right 12">
+            <a:extLst>
+              <a:ext uri="{FF2B5EF4-FFF2-40B4-BE49-F238E27FC236}">
+                <a16:creationId xmlns:a16="http://schemas.microsoft.com/office/drawing/2014/main" id="{4DD4A2CE-C362-4CFB-AEE0-2B390AD2D121}"/>
+              </a:ext>
+            </a:extLst>
+          </p:cNvPr>
+          <p:cNvSpPr/>
+          <p:nvPr/>
+        </p:nvSpPr>
+        <p:spPr>
+          <a:xfrm>
+            <a:off x="9003158" y="3756582"/>
+            <a:ext cx="529390" cy="473242"/>
+          </a:xfrm>
+          <a:prstGeom prst="rightArrow">
+            <a:avLst/>
+          </a:prstGeom>
+        </p:spPr>
+        <p:style>
+          <a:lnRef idx="2">
+            <a:schemeClr val="accent1">
+              <a:shade val="50000"/>
+            </a:schemeClr>
+          </a:lnRef>
+          <a:fillRef idx="1">
+            <a:schemeClr val="accent1"/>
+          </a:fillRef>
+          <a:effectRef idx="0">
+            <a:schemeClr val="accent1"/>
+          </a:effectRef>
+          <a:fontRef idx="minor">
+            <a:schemeClr val="lt1"/>
+          </a:fontRef>
+        </p:style>
+        <p:txBody>
+          <a:bodyPr rtlCol="0" anchor="ctr"/>
+          <a:lstStyle/>
+          <a:p>
+            <a:pPr algn="ctr"/>
+            <a:endParaRPr lang="en-GB"/>
+          </a:p>
+        </p:txBody>
+      </p:sp>
+      <p:sp>
+        <p:nvSpPr>
+          <p:cNvPr id="14" name="Arrow: Right 13">
+            <a:extLst>
+              <a:ext uri="{FF2B5EF4-FFF2-40B4-BE49-F238E27FC236}">
+                <a16:creationId xmlns:a16="http://schemas.microsoft.com/office/drawing/2014/main" id="{65C538D5-0520-407D-AE4F-670D0A418C8A}"/>
+              </a:ext>
+            </a:extLst>
+          </p:cNvPr>
+          <p:cNvSpPr/>
+          <p:nvPr/>
+        </p:nvSpPr>
+        <p:spPr>
+          <a:xfrm rot="2536312">
+            <a:off x="7042950" y="3302445"/>
+            <a:ext cx="529390" cy="473242"/>
+          </a:xfrm>
+          <a:prstGeom prst="rightArrow">
+            <a:avLst/>
+          </a:prstGeom>
+        </p:spPr>
+        <p:style>
+          <a:lnRef idx="2">
+            <a:schemeClr val="accent1">
+              <a:shade val="50000"/>
+            </a:schemeClr>
+          </a:lnRef>
+          <a:fillRef idx="1">
+            <a:schemeClr val="accent1"/>
+          </a:fillRef>
+          <a:effectRef idx="0">
+            <a:schemeClr val="accent1"/>
+          </a:effectRef>
+          <a:fontRef idx="minor">
+            <a:schemeClr val="lt1"/>
+          </a:fontRef>
+        </p:style>
+        <p:txBody>
+          <a:bodyPr rtlCol="0" anchor="ctr"/>
+          <a:lstStyle/>
+          <a:p>
+            <a:pPr algn="ctr"/>
+            <a:endParaRPr lang="en-GB"/>
+          </a:p>
+        </p:txBody>
+      </p:sp>
+      <p:sp>
+        <p:nvSpPr>
+          <p:cNvPr id="15" name="Arrow: Right 14">
+            <a:extLst>
+              <a:ext uri="{FF2B5EF4-FFF2-40B4-BE49-F238E27FC236}">
+                <a16:creationId xmlns:a16="http://schemas.microsoft.com/office/drawing/2014/main" id="{E44B5301-BDA2-455E-B288-D5EC4A1B70AC}"/>
+              </a:ext>
+            </a:extLst>
+          </p:cNvPr>
+          <p:cNvSpPr/>
+          <p:nvPr/>
+        </p:nvSpPr>
+        <p:spPr>
+          <a:xfrm rot="18929173">
+            <a:off x="7047960" y="4347506"/>
+            <a:ext cx="529390" cy="473242"/>
+          </a:xfrm>
+          <a:prstGeom prst="rightArrow">
+            <a:avLst/>
+          </a:prstGeom>
+        </p:spPr>
+        <p:style>
+          <a:lnRef idx="2">
+            <a:schemeClr val="accent1">
+              <a:shade val="50000"/>
+            </a:schemeClr>
+          </a:lnRef>
+          <a:fillRef idx="1">
+            <a:schemeClr val="accent1"/>
+          </a:fillRef>
+          <a:effectRef idx="0">
+            <a:schemeClr val="accent1"/>
+          </a:effectRef>
+          <a:fontRef idx="minor">
+            <a:schemeClr val="lt1"/>
+          </a:fontRef>
+        </p:style>
+        <p:txBody>
+          <a:bodyPr rtlCol="0" anchor="ctr"/>
+          <a:lstStyle/>
+          <a:p>
+            <a:pPr algn="ctr"/>
+            <a:endParaRPr lang="en-GB"/>
+          </a:p>
+        </p:txBody>
+      </p:sp>
+      <p:sp>
+        <p:nvSpPr>
+          <p:cNvPr id="16" name="Arrow: Right 15">
+            <a:extLst>
+              <a:ext uri="{FF2B5EF4-FFF2-40B4-BE49-F238E27FC236}">
+                <a16:creationId xmlns:a16="http://schemas.microsoft.com/office/drawing/2014/main" id="{8E0F715B-CEED-4FF4-ADAA-D912DED2C3EE}"/>
+              </a:ext>
+            </a:extLst>
+          </p:cNvPr>
+          <p:cNvSpPr/>
+          <p:nvPr/>
+        </p:nvSpPr>
+        <p:spPr>
+          <a:xfrm>
+            <a:off x="4879212" y="3184358"/>
+            <a:ext cx="529390" cy="473242"/>
+          </a:xfrm>
+          <a:prstGeom prst="rightArrow">
+            <a:avLst/>
+          </a:prstGeom>
+        </p:spPr>
+        <p:style>
+          <a:lnRef idx="2">
+            <a:schemeClr val="accent1">
+              <a:shade val="50000"/>
+            </a:schemeClr>
+          </a:lnRef>
+          <a:fillRef idx="1">
+            <a:schemeClr val="accent1"/>
+          </a:fillRef>
+          <a:effectRef idx="0">
+            <a:schemeClr val="accent1"/>
+          </a:effectRef>
+          <a:fontRef idx="minor">
+            <a:schemeClr val="lt1"/>
+          </a:fontRef>
+        </p:style>
+        <p:txBody>
+          <a:bodyPr rtlCol="0" anchor="ctr"/>
+          <a:lstStyle/>
+          <a:p>
+            <a:pPr algn="ctr"/>
+            <a:endParaRPr lang="en-GB"/>
+          </a:p>
+        </p:txBody>
+      </p:sp>
+      <p:sp>
+        <p:nvSpPr>
+          <p:cNvPr id="17" name="Arrow: Right 16">
+            <a:extLst>
+              <a:ext uri="{FF2B5EF4-FFF2-40B4-BE49-F238E27FC236}">
+                <a16:creationId xmlns:a16="http://schemas.microsoft.com/office/drawing/2014/main" id="{C2B0A06C-478F-4C4E-8ABC-49DD9D16BC67}"/>
+              </a:ext>
+            </a:extLst>
+          </p:cNvPr>
+          <p:cNvSpPr/>
+          <p:nvPr/>
+        </p:nvSpPr>
+        <p:spPr>
+          <a:xfrm>
+            <a:off x="4904154" y="4517143"/>
+            <a:ext cx="529390" cy="473242"/>
+          </a:xfrm>
+          <a:prstGeom prst="rightArrow">
+            <a:avLst/>
+          </a:prstGeom>
+        </p:spPr>
+        <p:style>
+          <a:lnRef idx="2">
+            <a:schemeClr val="accent1">
+              <a:shade val="50000"/>
+            </a:schemeClr>
+          </a:lnRef>
+          <a:fillRef idx="1">
+            <a:schemeClr val="accent1"/>
+          </a:fillRef>
+          <a:effectRef idx="0">
+            <a:schemeClr val="accent1"/>
+          </a:effectRef>
+          <a:fontRef idx="minor">
+            <a:schemeClr val="lt1"/>
+          </a:fontRef>
+        </p:style>
+        <p:txBody>
+          <a:bodyPr rtlCol="0" anchor="ctr"/>
+          <a:lstStyle/>
+          <a:p>
+            <a:pPr algn="ctr"/>
+            <a:endParaRPr lang="en-GB"/>
+          </a:p>
+        </p:txBody>
+      </p:sp>
+      <p:sp>
+        <p:nvSpPr>
+          <p:cNvPr id="18" name="Right Brace 17">
+            <a:extLst>
+              <a:ext uri="{FF2B5EF4-FFF2-40B4-BE49-F238E27FC236}">
+                <a16:creationId xmlns:a16="http://schemas.microsoft.com/office/drawing/2014/main" id="{F7066981-7F32-458A-A036-D8684C6FC1B6}"/>
+              </a:ext>
+            </a:extLst>
+          </p:cNvPr>
+          <p:cNvSpPr/>
+          <p:nvPr/>
+        </p:nvSpPr>
+        <p:spPr>
+          <a:xfrm>
+            <a:off x="4268161" y="2696492"/>
+            <a:ext cx="251124" cy="1451017"/>
+          </a:xfrm>
+          <a:prstGeom prst="rightBrace">
+            <a:avLst/>
+          </a:prstGeom>
+          <a:ln w="38100"/>
+        </p:spPr>
+        <p:style>
+          <a:lnRef idx="1">
+            <a:schemeClr val="accent1"/>
+          </a:lnRef>
+          <a:fillRef idx="0">
+            <a:schemeClr val="accent1"/>
+          </a:fillRef>
+          <a:effectRef idx="0">
+            <a:schemeClr val="accent1"/>
+          </a:effectRef>
+          <a:fontRef idx="minor">
+            <a:schemeClr val="tx1"/>
+          </a:fontRef>
+        </p:style>
+        <p:txBody>
+          <a:bodyPr rtlCol="0" anchor="ctr"/>
+          <a:lstStyle/>
+          <a:p>
+            <a:pPr algn="ctr"/>
+            <a:endParaRPr lang="en-GB"/>
+          </a:p>
+        </p:txBody>
+      </p:sp>
+    </p:spTree>
+    <p:extLst>
+      <p:ext uri="{BB962C8B-B14F-4D97-AF65-F5344CB8AC3E}">
+        <p14:creationId xmlns:p14="http://schemas.microsoft.com/office/powerpoint/2010/main" val="1486385229"/>
       </p:ext>
     </p:extLst>
   </p:cSld>

</xml_diff>

<commit_message>
Updated code style and cleanup part 2
</commit_message>
<xml_diff>
--- a/docs/Architecture.pptx
+++ b/docs/Architecture.pptx
@@ -10,6 +10,7 @@
     <p:sldId id="259" r:id="rId4"/>
     <p:sldId id="258" r:id="rId5"/>
     <p:sldId id="260" r:id="rId6"/>
+    <p:sldId id="261" r:id="rId7"/>
   </p:sldIdLst>
   <p:sldSz cx="12192000" cy="6858000"/>
   <p:notesSz cx="6858000" cy="9144000"/>
@@ -265,7 +266,7 @@
           <a:p>
             <a:fld id="{54F1D32B-7D3B-4D60-9555-54627BDE394B}" type="datetimeFigureOut">
               <a:rPr lang="en-GB" smtClean="0"/>
-              <a:t>20/05/2018</a:t>
+              <a:t>05/10/2018</a:t>
             </a:fld>
             <a:endParaRPr lang="en-GB"/>
           </a:p>
@@ -465,7 +466,7 @@
           <a:p>
             <a:fld id="{54F1D32B-7D3B-4D60-9555-54627BDE394B}" type="datetimeFigureOut">
               <a:rPr lang="en-GB" smtClean="0"/>
-              <a:t>20/05/2018</a:t>
+              <a:t>05/10/2018</a:t>
             </a:fld>
             <a:endParaRPr lang="en-GB"/>
           </a:p>
@@ -675,7 +676,7 @@
           <a:p>
             <a:fld id="{54F1D32B-7D3B-4D60-9555-54627BDE394B}" type="datetimeFigureOut">
               <a:rPr lang="en-GB" smtClean="0"/>
-              <a:t>20/05/2018</a:t>
+              <a:t>05/10/2018</a:t>
             </a:fld>
             <a:endParaRPr lang="en-GB"/>
           </a:p>
@@ -875,7 +876,7 @@
           <a:p>
             <a:fld id="{54F1D32B-7D3B-4D60-9555-54627BDE394B}" type="datetimeFigureOut">
               <a:rPr lang="en-GB" smtClean="0"/>
-              <a:t>20/05/2018</a:t>
+              <a:t>05/10/2018</a:t>
             </a:fld>
             <a:endParaRPr lang="en-GB"/>
           </a:p>
@@ -1151,7 +1152,7 @@
           <a:p>
             <a:fld id="{54F1D32B-7D3B-4D60-9555-54627BDE394B}" type="datetimeFigureOut">
               <a:rPr lang="en-GB" smtClean="0"/>
-              <a:t>20/05/2018</a:t>
+              <a:t>05/10/2018</a:t>
             </a:fld>
             <a:endParaRPr lang="en-GB"/>
           </a:p>
@@ -1419,7 +1420,7 @@
           <a:p>
             <a:fld id="{54F1D32B-7D3B-4D60-9555-54627BDE394B}" type="datetimeFigureOut">
               <a:rPr lang="en-GB" smtClean="0"/>
-              <a:t>20/05/2018</a:t>
+              <a:t>05/10/2018</a:t>
             </a:fld>
             <a:endParaRPr lang="en-GB"/>
           </a:p>
@@ -1834,7 +1835,7 @@
           <a:p>
             <a:fld id="{54F1D32B-7D3B-4D60-9555-54627BDE394B}" type="datetimeFigureOut">
               <a:rPr lang="en-GB" smtClean="0"/>
-              <a:t>20/05/2018</a:t>
+              <a:t>05/10/2018</a:t>
             </a:fld>
             <a:endParaRPr lang="en-GB"/>
           </a:p>
@@ -1976,7 +1977,7 @@
           <a:p>
             <a:fld id="{54F1D32B-7D3B-4D60-9555-54627BDE394B}" type="datetimeFigureOut">
               <a:rPr lang="en-GB" smtClean="0"/>
-              <a:t>20/05/2018</a:t>
+              <a:t>05/10/2018</a:t>
             </a:fld>
             <a:endParaRPr lang="en-GB"/>
           </a:p>
@@ -2089,7 +2090,7 @@
           <a:p>
             <a:fld id="{54F1D32B-7D3B-4D60-9555-54627BDE394B}" type="datetimeFigureOut">
               <a:rPr lang="en-GB" smtClean="0"/>
-              <a:t>20/05/2018</a:t>
+              <a:t>05/10/2018</a:t>
             </a:fld>
             <a:endParaRPr lang="en-GB"/>
           </a:p>
@@ -2402,7 +2403,7 @@
           <a:p>
             <a:fld id="{54F1D32B-7D3B-4D60-9555-54627BDE394B}" type="datetimeFigureOut">
               <a:rPr lang="en-GB" smtClean="0"/>
-              <a:t>20/05/2018</a:t>
+              <a:t>05/10/2018</a:t>
             </a:fld>
             <a:endParaRPr lang="en-GB"/>
           </a:p>
@@ -2691,7 +2692,7 @@
           <a:p>
             <a:fld id="{54F1D32B-7D3B-4D60-9555-54627BDE394B}" type="datetimeFigureOut">
               <a:rPr lang="en-GB" smtClean="0"/>
-              <a:t>20/05/2018</a:t>
+              <a:t>05/10/2018</a:t>
             </a:fld>
             <a:endParaRPr lang="en-GB"/>
           </a:p>
@@ -2934,7 +2935,7 @@
           <a:p>
             <a:fld id="{54F1D32B-7D3B-4D60-9555-54627BDE394B}" type="datetimeFigureOut">
               <a:rPr lang="en-GB" smtClean="0"/>
-              <a:t>20/05/2018</a:t>
+              <a:t>05/10/2018</a:t>
             </a:fld>
             <a:endParaRPr lang="en-GB"/>
           </a:p>
@@ -5389,6 +5390,619 @@
 </p:sld>
 </file>
 
+<file path=ppt/slides/slide6.xml><?xml version="1.0" encoding="utf-8"?>
+<p:sld xmlns:a="http://schemas.openxmlformats.org/drawingml/2006/main" xmlns:r="http://schemas.openxmlformats.org/officeDocument/2006/relationships" xmlns:p="http://schemas.openxmlformats.org/presentationml/2006/main">
+  <p:cSld>
+    <p:spTree>
+      <p:nvGrpSpPr>
+        <p:cNvPr id="1" name=""/>
+        <p:cNvGrpSpPr/>
+        <p:nvPr/>
+      </p:nvGrpSpPr>
+      <p:grpSpPr>
+        <a:xfrm>
+          <a:off x="0" y="0"/>
+          <a:ext cx="0" cy="0"/>
+          <a:chOff x="0" y="0"/>
+          <a:chExt cx="0" cy="0"/>
+        </a:xfrm>
+      </p:grpSpPr>
+      <p:sp>
+        <p:nvSpPr>
+          <p:cNvPr id="2" name="Title 1">
+            <a:extLst>
+              <a:ext uri="{FF2B5EF4-FFF2-40B4-BE49-F238E27FC236}">
+                <a16:creationId xmlns:a16="http://schemas.microsoft.com/office/drawing/2014/main" id="{FCF67970-C05E-4B41-82A0-B882EBC7031B}"/>
+              </a:ext>
+            </a:extLst>
+          </p:cNvPr>
+          <p:cNvSpPr>
+            <a:spLocks noGrp="1"/>
+          </p:cNvSpPr>
+          <p:nvPr>
+            <p:ph type="title"/>
+          </p:nvPr>
+        </p:nvSpPr>
+        <p:spPr/>
+        <p:txBody>
+          <a:bodyPr/>
+          <a:lstStyle/>
+          <a:p>
+            <a:r>
+              <a:rPr lang="en-GB" dirty="0"/>
+              <a:t>Static mapping requirements</a:t>
+            </a:r>
+          </a:p>
+        </p:txBody>
+      </p:sp>
+      <p:sp>
+        <p:nvSpPr>
+          <p:cNvPr id="5" name="TextBox 4">
+            <a:extLst>
+              <a:ext uri="{FF2B5EF4-FFF2-40B4-BE49-F238E27FC236}">
+                <a16:creationId xmlns:a16="http://schemas.microsoft.com/office/drawing/2014/main" id="{01228489-03B4-4D65-88E6-3A4DD8FB244C}"/>
+              </a:ext>
+            </a:extLst>
+          </p:cNvPr>
+          <p:cNvSpPr txBox="1"/>
+          <p:nvPr/>
+        </p:nvSpPr>
+        <p:spPr>
+          <a:xfrm>
+            <a:off x="3394630" y="2696492"/>
+            <a:ext cx="558166" cy="369332"/>
+          </a:xfrm>
+          <a:prstGeom prst="rect">
+            <a:avLst/>
+          </a:prstGeom>
+          <a:noFill/>
+        </p:spPr>
+        <p:txBody>
+          <a:bodyPr wrap="none" rtlCol="0">
+            <a:spAutoFit/>
+          </a:bodyPr>
+          <a:lstStyle/>
+          <a:p>
+            <a:r>
+              <a:rPr lang="en-GB" dirty="0"/>
+              <a:t>SNP</a:t>
+            </a:r>
+          </a:p>
+        </p:txBody>
+      </p:sp>
+      <p:sp>
+        <p:nvSpPr>
+          <p:cNvPr id="6" name="TextBox 5">
+            <a:extLst>
+              <a:ext uri="{FF2B5EF4-FFF2-40B4-BE49-F238E27FC236}">
+                <a16:creationId xmlns:a16="http://schemas.microsoft.com/office/drawing/2014/main" id="{86FFE9F6-A2BD-4EB3-8584-A97618C52BF3}"/>
+              </a:ext>
+            </a:extLst>
+          </p:cNvPr>
+          <p:cNvSpPr txBox="1"/>
+          <p:nvPr/>
+        </p:nvSpPr>
+        <p:spPr>
+          <a:xfrm>
+            <a:off x="3177841" y="3657600"/>
+            <a:ext cx="991746" cy="369332"/>
+          </a:xfrm>
+          <a:prstGeom prst="rect">
+            <a:avLst/>
+          </a:prstGeom>
+          <a:noFill/>
+        </p:spPr>
+        <p:txBody>
+          <a:bodyPr wrap="none" rtlCol="0">
+            <a:spAutoFit/>
+          </a:bodyPr>
+          <a:lstStyle/>
+          <a:p>
+            <a:r>
+              <a:rPr lang="en-GB" dirty="0"/>
+              <a:t>Peptides</a:t>
+            </a:r>
+          </a:p>
+        </p:txBody>
+      </p:sp>
+      <p:sp>
+        <p:nvSpPr>
+          <p:cNvPr id="7" name="TextBox 6">
+            <a:extLst>
+              <a:ext uri="{FF2B5EF4-FFF2-40B4-BE49-F238E27FC236}">
+                <a16:creationId xmlns:a16="http://schemas.microsoft.com/office/drawing/2014/main" id="{3680BDB7-8E75-4C2E-9503-C81BECE4E849}"/>
+              </a:ext>
+            </a:extLst>
+          </p:cNvPr>
+          <p:cNvSpPr txBox="1"/>
+          <p:nvPr/>
+        </p:nvSpPr>
+        <p:spPr>
+          <a:xfrm>
+            <a:off x="558482" y="4644242"/>
+            <a:ext cx="1899046" cy="369332"/>
+          </a:xfrm>
+          <a:prstGeom prst="rect">
+            <a:avLst/>
+          </a:prstGeom>
+          <a:noFill/>
+        </p:spPr>
+        <p:txBody>
+          <a:bodyPr wrap="none" rtlCol="0">
+            <a:spAutoFit/>
+          </a:bodyPr>
+          <a:lstStyle/>
+          <a:p>
+            <a:r>
+              <a:rPr lang="en-GB" dirty="0"/>
+              <a:t>Modified Peptides</a:t>
+            </a:r>
+          </a:p>
+        </p:txBody>
+      </p:sp>
+      <p:sp>
+        <p:nvSpPr>
+          <p:cNvPr id="8" name="TextBox 7">
+            <a:extLst>
+              <a:ext uri="{FF2B5EF4-FFF2-40B4-BE49-F238E27FC236}">
+                <a16:creationId xmlns:a16="http://schemas.microsoft.com/office/drawing/2014/main" id="{DB84A4BA-3834-4DB7-BD30-E03A02C44181}"/>
+              </a:ext>
+            </a:extLst>
+          </p:cNvPr>
+          <p:cNvSpPr txBox="1"/>
+          <p:nvPr/>
+        </p:nvSpPr>
+        <p:spPr>
+          <a:xfrm>
+            <a:off x="3287229" y="3185928"/>
+            <a:ext cx="772969" cy="369332"/>
+          </a:xfrm>
+          <a:prstGeom prst="rect">
+            <a:avLst/>
+          </a:prstGeom>
+          <a:noFill/>
+        </p:spPr>
+        <p:txBody>
+          <a:bodyPr wrap="none" rtlCol="0">
+            <a:spAutoFit/>
+          </a:bodyPr>
+          <a:lstStyle/>
+          <a:p>
+            <a:r>
+              <a:rPr lang="en-GB" dirty="0"/>
+              <a:t>Genes</a:t>
+            </a:r>
+          </a:p>
+        </p:txBody>
+      </p:sp>
+      <p:sp>
+        <p:nvSpPr>
+          <p:cNvPr id="9" name="TextBox 8">
+            <a:extLst>
+              <a:ext uri="{FF2B5EF4-FFF2-40B4-BE49-F238E27FC236}">
+                <a16:creationId xmlns:a16="http://schemas.microsoft.com/office/drawing/2014/main" id="{23C510E2-9F59-466E-8097-8F3DB5230263}"/>
+              </a:ext>
+            </a:extLst>
+          </p:cNvPr>
+          <p:cNvSpPr txBox="1"/>
+          <p:nvPr/>
+        </p:nvSpPr>
+        <p:spPr>
+          <a:xfrm>
+            <a:off x="5657154" y="3818190"/>
+            <a:ext cx="955903" cy="369332"/>
+          </a:xfrm>
+          <a:prstGeom prst="rect">
+            <a:avLst/>
+          </a:prstGeom>
+          <a:noFill/>
+        </p:spPr>
+        <p:txBody>
+          <a:bodyPr wrap="none" rtlCol="0">
+            <a:spAutoFit/>
+          </a:bodyPr>
+          <a:lstStyle/>
+          <a:p>
+            <a:r>
+              <a:rPr lang="en-GB" dirty="0"/>
+              <a:t>Proteins</a:t>
+            </a:r>
+          </a:p>
+        </p:txBody>
+      </p:sp>
+      <p:sp>
+        <p:nvSpPr>
+          <p:cNvPr id="10" name="TextBox 9">
+            <a:extLst>
+              <a:ext uri="{FF2B5EF4-FFF2-40B4-BE49-F238E27FC236}">
+                <a16:creationId xmlns:a16="http://schemas.microsoft.com/office/drawing/2014/main" id="{A644A67D-118C-4766-817B-8A37A06C6C20}"/>
+              </a:ext>
+            </a:extLst>
+          </p:cNvPr>
+          <p:cNvSpPr txBox="1"/>
+          <p:nvPr/>
+        </p:nvSpPr>
+        <p:spPr>
+          <a:xfrm>
+            <a:off x="3431922" y="4629213"/>
+            <a:ext cx="1354986" cy="369332"/>
+          </a:xfrm>
+          <a:prstGeom prst="rect">
+            <a:avLst/>
+          </a:prstGeom>
+          <a:noFill/>
+        </p:spPr>
+        <p:txBody>
+          <a:bodyPr wrap="none" rtlCol="0">
+            <a:spAutoFit/>
+          </a:bodyPr>
+          <a:lstStyle/>
+          <a:p>
+            <a:r>
+              <a:rPr lang="en-GB" dirty="0"/>
+              <a:t>Proteoforms</a:t>
+            </a:r>
+          </a:p>
+        </p:txBody>
+      </p:sp>
+      <p:sp>
+        <p:nvSpPr>
+          <p:cNvPr id="11" name="TextBox 10">
+            <a:extLst>
+              <a:ext uri="{FF2B5EF4-FFF2-40B4-BE49-F238E27FC236}">
+                <a16:creationId xmlns:a16="http://schemas.microsoft.com/office/drawing/2014/main" id="{2874E7D2-0CAC-4AD3-9C60-9DD49AACAC75}"/>
+              </a:ext>
+            </a:extLst>
+          </p:cNvPr>
+          <p:cNvSpPr txBox="1"/>
+          <p:nvPr/>
+        </p:nvSpPr>
+        <p:spPr>
+          <a:xfrm>
+            <a:off x="7662673" y="3813061"/>
+            <a:ext cx="1092735" cy="369332"/>
+          </a:xfrm>
+          <a:prstGeom prst="rect">
+            <a:avLst/>
+          </a:prstGeom>
+          <a:noFill/>
+        </p:spPr>
+        <p:txBody>
+          <a:bodyPr wrap="none" rtlCol="0">
+            <a:spAutoFit/>
+          </a:bodyPr>
+          <a:lstStyle/>
+          <a:p>
+            <a:r>
+              <a:rPr lang="en-GB" dirty="0"/>
+              <a:t>Reactions</a:t>
+            </a:r>
+          </a:p>
+        </p:txBody>
+      </p:sp>
+      <p:sp>
+        <p:nvSpPr>
+          <p:cNvPr id="12" name="TextBox 11">
+            <a:extLst>
+              <a:ext uri="{FF2B5EF4-FFF2-40B4-BE49-F238E27FC236}">
+                <a16:creationId xmlns:a16="http://schemas.microsoft.com/office/drawing/2014/main" id="{9AF8A85F-A579-4F41-AD3A-9861AE5C7765}"/>
+              </a:ext>
+            </a:extLst>
+          </p:cNvPr>
+          <p:cNvSpPr txBox="1"/>
+          <p:nvPr/>
+        </p:nvSpPr>
+        <p:spPr>
+          <a:xfrm>
+            <a:off x="9619489" y="3808537"/>
+            <a:ext cx="1064715" cy="369332"/>
+          </a:xfrm>
+          <a:prstGeom prst="rect">
+            <a:avLst/>
+          </a:prstGeom>
+          <a:noFill/>
+        </p:spPr>
+        <p:txBody>
+          <a:bodyPr wrap="none" rtlCol="0">
+            <a:spAutoFit/>
+          </a:bodyPr>
+          <a:lstStyle/>
+          <a:p>
+            <a:r>
+              <a:rPr lang="en-GB" dirty="0"/>
+              <a:t>Pathways</a:t>
+            </a:r>
+          </a:p>
+        </p:txBody>
+      </p:sp>
+      <p:sp>
+        <p:nvSpPr>
+          <p:cNvPr id="13" name="Arrow: Right 12">
+            <a:extLst>
+              <a:ext uri="{FF2B5EF4-FFF2-40B4-BE49-F238E27FC236}">
+                <a16:creationId xmlns:a16="http://schemas.microsoft.com/office/drawing/2014/main" id="{4DD4A2CE-C362-4CFB-AEE0-2B390AD2D121}"/>
+              </a:ext>
+            </a:extLst>
+          </p:cNvPr>
+          <p:cNvSpPr/>
+          <p:nvPr/>
+        </p:nvSpPr>
+        <p:spPr>
+          <a:xfrm>
+            <a:off x="9003158" y="3756582"/>
+            <a:ext cx="529390" cy="473242"/>
+          </a:xfrm>
+          <a:prstGeom prst="rightArrow">
+            <a:avLst/>
+          </a:prstGeom>
+        </p:spPr>
+        <p:style>
+          <a:lnRef idx="2">
+            <a:schemeClr val="accent1">
+              <a:shade val="50000"/>
+            </a:schemeClr>
+          </a:lnRef>
+          <a:fillRef idx="1">
+            <a:schemeClr val="accent1"/>
+          </a:fillRef>
+          <a:effectRef idx="0">
+            <a:schemeClr val="accent1"/>
+          </a:effectRef>
+          <a:fontRef idx="minor">
+            <a:schemeClr val="lt1"/>
+          </a:fontRef>
+        </p:style>
+        <p:txBody>
+          <a:bodyPr rtlCol="0" anchor="ctr"/>
+          <a:lstStyle/>
+          <a:p>
+            <a:pPr algn="ctr"/>
+            <a:endParaRPr lang="en-GB"/>
+          </a:p>
+        </p:txBody>
+      </p:sp>
+      <p:sp>
+        <p:nvSpPr>
+          <p:cNvPr id="14" name="Arrow: Right 13">
+            <a:extLst>
+              <a:ext uri="{FF2B5EF4-FFF2-40B4-BE49-F238E27FC236}">
+                <a16:creationId xmlns:a16="http://schemas.microsoft.com/office/drawing/2014/main" id="{65C538D5-0520-407D-AE4F-670D0A418C8A}"/>
+              </a:ext>
+            </a:extLst>
+          </p:cNvPr>
+          <p:cNvSpPr/>
+          <p:nvPr/>
+        </p:nvSpPr>
+        <p:spPr>
+          <a:xfrm>
+            <a:off x="6885533" y="3756582"/>
+            <a:ext cx="529390" cy="473242"/>
+          </a:xfrm>
+          <a:prstGeom prst="rightArrow">
+            <a:avLst/>
+          </a:prstGeom>
+        </p:spPr>
+        <p:style>
+          <a:lnRef idx="2">
+            <a:schemeClr val="accent1">
+              <a:shade val="50000"/>
+            </a:schemeClr>
+          </a:lnRef>
+          <a:fillRef idx="1">
+            <a:schemeClr val="accent1"/>
+          </a:fillRef>
+          <a:effectRef idx="0">
+            <a:schemeClr val="accent1"/>
+          </a:effectRef>
+          <a:fontRef idx="minor">
+            <a:schemeClr val="lt1"/>
+          </a:fontRef>
+        </p:style>
+        <p:txBody>
+          <a:bodyPr rtlCol="0" anchor="ctr"/>
+          <a:lstStyle/>
+          <a:p>
+            <a:pPr algn="ctr"/>
+            <a:endParaRPr lang="en-GB"/>
+          </a:p>
+        </p:txBody>
+      </p:sp>
+      <p:sp>
+        <p:nvSpPr>
+          <p:cNvPr id="15" name="Arrow: Right 14">
+            <a:extLst>
+              <a:ext uri="{FF2B5EF4-FFF2-40B4-BE49-F238E27FC236}">
+                <a16:creationId xmlns:a16="http://schemas.microsoft.com/office/drawing/2014/main" id="{E44B5301-BDA2-455E-B288-D5EC4A1B70AC}"/>
+              </a:ext>
+            </a:extLst>
+          </p:cNvPr>
+          <p:cNvSpPr/>
+          <p:nvPr/>
+        </p:nvSpPr>
+        <p:spPr>
+          <a:xfrm rot="18929173">
+            <a:off x="4876852" y="4422651"/>
+            <a:ext cx="529390" cy="473242"/>
+          </a:xfrm>
+          <a:prstGeom prst="rightArrow">
+            <a:avLst/>
+          </a:prstGeom>
+        </p:spPr>
+        <p:style>
+          <a:lnRef idx="2">
+            <a:schemeClr val="accent1">
+              <a:shade val="50000"/>
+            </a:schemeClr>
+          </a:lnRef>
+          <a:fillRef idx="1">
+            <a:schemeClr val="accent1"/>
+          </a:fillRef>
+          <a:effectRef idx="0">
+            <a:schemeClr val="accent1"/>
+          </a:effectRef>
+          <a:fontRef idx="minor">
+            <a:schemeClr val="lt1"/>
+          </a:fontRef>
+        </p:style>
+        <p:txBody>
+          <a:bodyPr rtlCol="0" anchor="ctr"/>
+          <a:lstStyle/>
+          <a:p>
+            <a:pPr algn="ctr"/>
+            <a:endParaRPr lang="en-GB"/>
+          </a:p>
+        </p:txBody>
+      </p:sp>
+      <p:sp>
+        <p:nvSpPr>
+          <p:cNvPr id="16" name="Arrow: Right 15">
+            <a:extLst>
+              <a:ext uri="{FF2B5EF4-FFF2-40B4-BE49-F238E27FC236}">
+                <a16:creationId xmlns:a16="http://schemas.microsoft.com/office/drawing/2014/main" id="{8E0F715B-CEED-4FF4-ADAA-D912DED2C3EE}"/>
+              </a:ext>
+            </a:extLst>
+          </p:cNvPr>
+          <p:cNvSpPr/>
+          <p:nvPr/>
+        </p:nvSpPr>
+        <p:spPr>
+          <a:xfrm rot="1702888">
+            <a:off x="4854618" y="3431029"/>
+            <a:ext cx="529390" cy="473242"/>
+          </a:xfrm>
+          <a:prstGeom prst="rightArrow">
+            <a:avLst/>
+          </a:prstGeom>
+        </p:spPr>
+        <p:style>
+          <a:lnRef idx="2">
+            <a:schemeClr val="accent1">
+              <a:shade val="50000"/>
+            </a:schemeClr>
+          </a:lnRef>
+          <a:fillRef idx="1">
+            <a:schemeClr val="accent1"/>
+          </a:fillRef>
+          <a:effectRef idx="0">
+            <a:schemeClr val="accent1"/>
+          </a:effectRef>
+          <a:fontRef idx="minor">
+            <a:schemeClr val="lt1"/>
+          </a:fontRef>
+        </p:style>
+        <p:txBody>
+          <a:bodyPr rtlCol="0" anchor="ctr"/>
+          <a:lstStyle/>
+          <a:p>
+            <a:pPr algn="ctr"/>
+            <a:endParaRPr lang="en-GB"/>
+          </a:p>
+        </p:txBody>
+      </p:sp>
+      <p:sp>
+        <p:nvSpPr>
+          <p:cNvPr id="17" name="Arrow: Right 16">
+            <a:extLst>
+              <a:ext uri="{FF2B5EF4-FFF2-40B4-BE49-F238E27FC236}">
+                <a16:creationId xmlns:a16="http://schemas.microsoft.com/office/drawing/2014/main" id="{C2B0A06C-478F-4C4E-8ABC-49DD9D16BC67}"/>
+              </a:ext>
+            </a:extLst>
+          </p:cNvPr>
+          <p:cNvSpPr/>
+          <p:nvPr/>
+        </p:nvSpPr>
+        <p:spPr>
+          <a:xfrm>
+            <a:off x="2738445" y="4577258"/>
+            <a:ext cx="529390" cy="473242"/>
+          </a:xfrm>
+          <a:prstGeom prst="rightArrow">
+            <a:avLst/>
+          </a:prstGeom>
+        </p:spPr>
+        <p:style>
+          <a:lnRef idx="2">
+            <a:schemeClr val="accent1">
+              <a:shade val="50000"/>
+            </a:schemeClr>
+          </a:lnRef>
+          <a:fillRef idx="1">
+            <a:schemeClr val="accent1"/>
+          </a:fillRef>
+          <a:effectRef idx="0">
+            <a:schemeClr val="accent1"/>
+          </a:effectRef>
+          <a:fontRef idx="minor">
+            <a:schemeClr val="lt1"/>
+          </a:fontRef>
+        </p:style>
+        <p:txBody>
+          <a:bodyPr rtlCol="0" anchor="ctr"/>
+          <a:lstStyle/>
+          <a:p>
+            <a:pPr algn="ctr"/>
+            <a:endParaRPr lang="en-GB"/>
+          </a:p>
+        </p:txBody>
+      </p:sp>
+      <p:sp>
+        <p:nvSpPr>
+          <p:cNvPr id="18" name="Right Brace 17">
+            <a:extLst>
+              <a:ext uri="{FF2B5EF4-FFF2-40B4-BE49-F238E27FC236}">
+                <a16:creationId xmlns:a16="http://schemas.microsoft.com/office/drawing/2014/main" id="{F7066981-7F32-458A-A036-D8684C6FC1B6}"/>
+              </a:ext>
+            </a:extLst>
+          </p:cNvPr>
+          <p:cNvSpPr/>
+          <p:nvPr/>
+        </p:nvSpPr>
+        <p:spPr>
+          <a:xfrm>
+            <a:off x="4268161" y="2696492"/>
+            <a:ext cx="251124" cy="1451017"/>
+          </a:xfrm>
+          <a:prstGeom prst="rightBrace">
+            <a:avLst/>
+          </a:prstGeom>
+          <a:ln w="38100"/>
+        </p:spPr>
+        <p:style>
+          <a:lnRef idx="1">
+            <a:schemeClr val="accent1"/>
+          </a:lnRef>
+          <a:fillRef idx="0">
+            <a:schemeClr val="accent1"/>
+          </a:fillRef>
+          <a:effectRef idx="0">
+            <a:schemeClr val="accent1"/>
+          </a:effectRef>
+          <a:fontRef idx="minor">
+            <a:schemeClr val="tx1"/>
+          </a:fontRef>
+        </p:style>
+        <p:txBody>
+          <a:bodyPr rtlCol="0" anchor="ctr"/>
+          <a:lstStyle/>
+          <a:p>
+            <a:pPr algn="ctr"/>
+            <a:endParaRPr lang="en-GB"/>
+          </a:p>
+        </p:txBody>
+      </p:sp>
+    </p:spTree>
+    <p:extLst>
+      <p:ext uri="{BB962C8B-B14F-4D97-AF65-F5344CB8AC3E}">
+        <p14:creationId xmlns:p14="http://schemas.microsoft.com/office/powerpoint/2010/main" val="534751654"/>
+      </p:ext>
+    </p:extLst>
+  </p:cSld>
+  <p:clrMapOvr>
+    <a:masterClrMapping/>
+  </p:clrMapOvr>
+</p:sld>
+</file>
+
 <file path=ppt/theme/theme1.xml><?xml version="1.0" encoding="utf-8"?>
 <a:theme xmlns:a="http://schemas.openxmlformats.org/drawingml/2006/main" name="Office Theme">
   <a:themeElements>

</xml_diff>